<commit_message>
replace Event with ParkingLot into notes
</commit_message>
<xml_diff>
--- a/Asp-net-core IQuest.pptx
+++ b/Asp-net-core IQuest.pptx
@@ -2874,7 +2874,7 @@
             <a:spLocks noGrp="1"/>
           </p:cNvSpPr>
           <p:nvPr>
-            <p:ph type="sldNum" sz="quarter" idx="10"/>
+            <p:ph type="sldNum" sz="quarter" idx="5"/>
           </p:nvPr>
         </p:nvSpPr>
         <p:spPr/>
@@ -2884,7 +2884,7 @@
           <a:p>
             <a:fld id="{4DB2BA24-A594-42FE-968E-B893334C608F}" type="slidenum">
               <a:rPr lang="en-US" smtClean="0"/>
-              <a:t>2</a:t>
+              <a:t>1</a:t>
             </a:fld>
             <a:endParaRPr lang="en-US"/>
           </a:p>
@@ -2893,7 +2893,7 @@
     </p:spTree>
     <p:extLst>
       <p:ext uri="{BB962C8B-B14F-4D97-AF65-F5344CB8AC3E}">
-        <p14:creationId xmlns:p14="http://schemas.microsoft.com/office/powerpoint/2010/main" val="2628241040"/>
+        <p14:creationId xmlns:p14="http://schemas.microsoft.com/office/powerpoint/2010/main" val="2971943312"/>
       </p:ext>
     </p:extLst>
   </p:cSld>
@@ -2966,7 +2966,7 @@
             </a:pPr>
             <a:r>
               <a:rPr lang="en-US" dirty="0"/>
-              <a:t>https://github.com/dotnet/cli</a:t>
+              <a:t>https://github.com/dotnet/cli Command Line Interface</a:t>
             </a:r>
           </a:p>
           <a:p>
@@ -2991,7 +2991,7 @@
           <a:p>
             <a:fld id="{4DB2BA24-A594-42FE-968E-B893334C608F}" type="slidenum">
               <a:rPr lang="en-US" smtClean="0"/>
-              <a:t>16</a:t>
+              <a:t>15</a:t>
             </a:fld>
             <a:endParaRPr lang="en-US"/>
           </a:p>
@@ -3000,7 +3000,7 @@
     </p:spTree>
     <p:extLst>
       <p:ext uri="{BB962C8B-B14F-4D97-AF65-F5344CB8AC3E}">
-        <p14:creationId xmlns:p14="http://schemas.microsoft.com/office/powerpoint/2010/main" val="387626510"/>
+        <p14:creationId xmlns:p14="http://schemas.microsoft.com/office/powerpoint/2010/main" val="1736990485"/>
       </p:ext>
     </p:extLst>
   </p:cSld>
@@ -3054,9 +3054,26 @@
           <a:bodyPr/>
           <a:lstStyle/>
           <a:p>
+            <a:pPr marL="0" marR="0" lvl="0" indent="0" algn="l" defTabSz="914400" rtl="0" eaLnBrk="1" fontAlgn="auto" latinLnBrk="0" hangingPunct="1">
+              <a:lnSpc>
+                <a:spcPct val="100000"/>
+              </a:lnSpc>
+              <a:spcBef>
+                <a:spcPts val="0"/>
+              </a:spcBef>
+              <a:spcAft>
+                <a:spcPts val="0"/>
+              </a:spcAft>
+              <a:buClrTx/>
+              <a:buSzTx/>
+              <a:buFontTx/>
+              <a:buNone/>
+              <a:tabLst/>
+              <a:defRPr/>
+            </a:pPr>
             <a:r>
               <a:rPr lang="en-US" dirty="0"/>
-              <a:t>ordering is important</a:t>
+              <a:t>https://github.com/dotnet/cli</a:t>
             </a:r>
           </a:p>
           <a:p>
@@ -3081,7 +3098,7 @@
           <a:p>
             <a:fld id="{4DB2BA24-A594-42FE-968E-B893334C608F}" type="slidenum">
               <a:rPr lang="en-US" smtClean="0"/>
-              <a:t>20</a:t>
+              <a:t>16</a:t>
             </a:fld>
             <a:endParaRPr lang="en-US"/>
           </a:p>
@@ -3090,7 +3107,7 @@
     </p:spTree>
     <p:extLst>
       <p:ext uri="{BB962C8B-B14F-4D97-AF65-F5344CB8AC3E}">
-        <p14:creationId xmlns:p14="http://schemas.microsoft.com/office/powerpoint/2010/main" val="3348467157"/>
+        <p14:creationId xmlns:p14="http://schemas.microsoft.com/office/powerpoint/2010/main" val="387626510"/>
       </p:ext>
     </p:extLst>
   </p:cSld>
@@ -3146,8 +3163,11 @@
           <a:p>
             <a:r>
               <a:rPr lang="en-US" dirty="0"/>
-              <a:t>Each source with specific provider</a:t>
-            </a:r>
+              <a:t>ordering is important</a:t>
+            </a:r>
+          </a:p>
+          <a:p>
+            <a:endParaRPr lang="en-US" dirty="0"/>
           </a:p>
         </p:txBody>
       </p:sp>
@@ -3168,7 +3188,7 @@
           <a:p>
             <a:fld id="{4DB2BA24-A594-42FE-968E-B893334C608F}" type="slidenum">
               <a:rPr lang="en-US" smtClean="0"/>
-              <a:t>21</a:t>
+              <a:t>20</a:t>
             </a:fld>
             <a:endParaRPr lang="en-US"/>
           </a:p>
@@ -3177,7 +3197,7 @@
     </p:spTree>
     <p:extLst>
       <p:ext uri="{BB962C8B-B14F-4D97-AF65-F5344CB8AC3E}">
-        <p14:creationId xmlns:p14="http://schemas.microsoft.com/office/powerpoint/2010/main" val="2716460805"/>
+        <p14:creationId xmlns:p14="http://schemas.microsoft.com/office/powerpoint/2010/main" val="3348467157"/>
       </p:ext>
     </p:extLst>
   </p:cSld>
@@ -3255,7 +3275,7 @@
           <a:p>
             <a:fld id="{4DB2BA24-A594-42FE-968E-B893334C608F}" type="slidenum">
               <a:rPr lang="en-US" smtClean="0"/>
-              <a:t>22</a:t>
+              <a:t>21</a:t>
             </a:fld>
             <a:endParaRPr lang="en-US"/>
           </a:p>
@@ -3264,7 +3284,7 @@
     </p:spTree>
     <p:extLst>
       <p:ext uri="{BB962C8B-B14F-4D97-AF65-F5344CB8AC3E}">
-        <p14:creationId xmlns:p14="http://schemas.microsoft.com/office/powerpoint/2010/main" val="3086540312"/>
+        <p14:creationId xmlns:p14="http://schemas.microsoft.com/office/powerpoint/2010/main" val="2716460805"/>
       </p:ext>
     </p:extLst>
   </p:cSld>
@@ -3318,7 +3338,10 @@
           <a:bodyPr/>
           <a:lstStyle/>
           <a:p>
-            <a:endParaRPr lang="en-US" dirty="0"/>
+            <a:r>
+              <a:rPr lang="en-US" dirty="0"/>
+              <a:t>Each source with specific provider</a:t>
+            </a:r>
           </a:p>
         </p:txBody>
       </p:sp>
@@ -3339,7 +3362,7 @@
           <a:p>
             <a:fld id="{4DB2BA24-A594-42FE-968E-B893334C608F}" type="slidenum">
               <a:rPr lang="en-US" smtClean="0"/>
-              <a:t>23</a:t>
+              <a:t>22</a:t>
             </a:fld>
             <a:endParaRPr lang="en-US"/>
           </a:p>
@@ -3348,7 +3371,7 @@
     </p:spTree>
     <p:extLst>
       <p:ext uri="{BB962C8B-B14F-4D97-AF65-F5344CB8AC3E}">
-        <p14:creationId xmlns:p14="http://schemas.microsoft.com/office/powerpoint/2010/main" val="636001811"/>
+        <p14:creationId xmlns:p14="http://schemas.microsoft.com/office/powerpoint/2010/main" val="3086540312"/>
       </p:ext>
     </p:extLst>
   </p:cSld>
@@ -3423,7 +3446,7 @@
           <a:p>
             <a:fld id="{4DB2BA24-A594-42FE-968E-B893334C608F}" type="slidenum">
               <a:rPr lang="en-US" smtClean="0"/>
-              <a:t>24</a:t>
+              <a:t>23</a:t>
             </a:fld>
             <a:endParaRPr lang="en-US"/>
           </a:p>
@@ -3432,7 +3455,7 @@
     </p:spTree>
     <p:extLst>
       <p:ext uri="{BB962C8B-B14F-4D97-AF65-F5344CB8AC3E}">
-        <p14:creationId xmlns:p14="http://schemas.microsoft.com/office/powerpoint/2010/main" val="2333512939"/>
+        <p14:creationId xmlns:p14="http://schemas.microsoft.com/office/powerpoint/2010/main" val="636001811"/>
       </p:ext>
     </p:extLst>
   </p:cSld>
@@ -3486,140 +3509,6 @@
           <a:bodyPr/>
           <a:lstStyle/>
           <a:p>
-            <a:r>
-              <a:rPr lang="en-US" dirty="0" err="1"/>
-              <a:t>logging.AddConsole</a:t>
-            </a:r>
-            <a:r>
-              <a:rPr lang="en-US" dirty="0"/>
-              <a:t>(); </a:t>
-            </a:r>
-            <a:r>
-              <a:rPr lang="en-US" sz="1200" kern="1200" dirty="0">
-                <a:solidFill>
-                  <a:schemeClr val="tx1"/>
-                </a:solidFill>
-                <a:effectLst/>
-                <a:latin typeface="+mn-lt"/>
-                <a:ea typeface="+mn-ea"/>
-                <a:cs typeface="+mn-cs"/>
-              </a:rPr>
-              <a:t>// by default in </a:t>
-            </a:r>
-            <a:r>
-              <a:rPr lang="en-US" sz="1200" kern="1200" dirty="0" err="1">
-                <a:solidFill>
-                  <a:schemeClr val="tx1"/>
-                </a:solidFill>
-                <a:effectLst/>
-                <a:latin typeface="+mn-lt"/>
-                <a:ea typeface="+mn-ea"/>
-                <a:cs typeface="+mn-cs"/>
-              </a:rPr>
-              <a:t>CreateDefaultBuilder</a:t>
-            </a:r>
-            <a:r>
-              <a:rPr lang="en-US" dirty="0"/>
-              <a:t>                  </a:t>
-            </a:r>
-          </a:p>
-          <a:p>
-            <a:r>
-              <a:rPr lang="en-US" dirty="0" err="1"/>
-              <a:t>logging.AddDebug</a:t>
-            </a:r>
-            <a:r>
-              <a:rPr lang="en-US" dirty="0"/>
-              <a:t>(); </a:t>
-            </a:r>
-            <a:r>
-              <a:rPr lang="en-US" sz="1200" kern="1200" dirty="0">
-                <a:solidFill>
-                  <a:schemeClr val="tx1"/>
-                </a:solidFill>
-                <a:effectLst/>
-                <a:latin typeface="+mn-lt"/>
-                <a:ea typeface="+mn-ea"/>
-                <a:cs typeface="+mn-cs"/>
-              </a:rPr>
-              <a:t>// by default in </a:t>
-            </a:r>
-            <a:r>
-              <a:rPr lang="en-US" sz="1200" kern="1200" dirty="0" err="1">
-                <a:solidFill>
-                  <a:schemeClr val="tx1"/>
-                </a:solidFill>
-                <a:effectLst/>
-                <a:latin typeface="+mn-lt"/>
-                <a:ea typeface="+mn-ea"/>
-                <a:cs typeface="+mn-cs"/>
-              </a:rPr>
-              <a:t>CreateDefaultBuilder</a:t>
-            </a:r>
-            <a:r>
-              <a:rPr lang="en-US" dirty="0"/>
-              <a:t>                   </a:t>
-            </a:r>
-          </a:p>
-          <a:p>
-            <a:r>
-              <a:rPr lang="en-US" dirty="0" err="1"/>
-              <a:t>logging.AddEventSourceLogger</a:t>
-            </a:r>
-            <a:r>
-              <a:rPr lang="en-US" dirty="0"/>
-              <a:t>(); </a:t>
-            </a:r>
-            <a:r>
-              <a:rPr lang="en-US" sz="1200" kern="1200" dirty="0">
-                <a:solidFill>
-                  <a:schemeClr val="tx1"/>
-                </a:solidFill>
-                <a:effectLst/>
-                <a:latin typeface="+mn-lt"/>
-                <a:ea typeface="+mn-ea"/>
-                <a:cs typeface="+mn-cs"/>
-              </a:rPr>
-              <a:t>// by default in </a:t>
-            </a:r>
-            <a:r>
-              <a:rPr lang="en-US" sz="1200" kern="1200" dirty="0" err="1">
-                <a:solidFill>
-                  <a:schemeClr val="tx1"/>
-                </a:solidFill>
-                <a:effectLst/>
-                <a:latin typeface="+mn-lt"/>
-                <a:ea typeface="+mn-ea"/>
-                <a:cs typeface="+mn-cs"/>
-              </a:rPr>
-              <a:t>CreateDefaultBuilder</a:t>
-            </a:r>
-            <a:endParaRPr lang="en-US" sz="1200" kern="1200" dirty="0">
-              <a:solidFill>
-                <a:schemeClr val="tx1"/>
-              </a:solidFill>
-              <a:effectLst/>
-              <a:latin typeface="+mn-lt"/>
-              <a:ea typeface="+mn-ea"/>
-              <a:cs typeface="+mn-cs"/>
-            </a:endParaRPr>
-          </a:p>
-          <a:p>
-            <a:endParaRPr lang="en-US" sz="1200" kern="1200" dirty="0">
-              <a:solidFill>
-                <a:schemeClr val="tx1"/>
-              </a:solidFill>
-              <a:effectLst/>
-              <a:latin typeface="+mn-lt"/>
-              <a:ea typeface="+mn-ea"/>
-              <a:cs typeface="+mn-cs"/>
-            </a:endParaRPr>
-          </a:p>
-          <a:p>
-            <a:r>
-              <a:rPr lang="en-US" dirty="0" err="1"/>
-              <a:t>ClearProviders</a:t>
-            </a:r>
             <a:endParaRPr lang="en-US" dirty="0"/>
           </a:p>
         </p:txBody>
@@ -3641,7 +3530,7 @@
           <a:p>
             <a:fld id="{4DB2BA24-A594-42FE-968E-B893334C608F}" type="slidenum">
               <a:rPr lang="en-US" smtClean="0"/>
-              <a:t>25</a:t>
+              <a:t>24</a:t>
             </a:fld>
             <a:endParaRPr lang="en-US"/>
           </a:p>
@@ -3650,7 +3539,7 @@
     </p:spTree>
     <p:extLst>
       <p:ext uri="{BB962C8B-B14F-4D97-AF65-F5344CB8AC3E}">
-        <p14:creationId xmlns:p14="http://schemas.microsoft.com/office/powerpoint/2010/main" val="2491721671"/>
+        <p14:creationId xmlns:p14="http://schemas.microsoft.com/office/powerpoint/2010/main" val="2333512939"/>
       </p:ext>
     </p:extLst>
   </p:cSld>
@@ -3704,6 +3593,140 @@
           <a:bodyPr/>
           <a:lstStyle/>
           <a:p>
+            <a:r>
+              <a:rPr lang="en-US" dirty="0" err="1"/>
+              <a:t>logging.AddConsole</a:t>
+            </a:r>
+            <a:r>
+              <a:rPr lang="en-US" dirty="0"/>
+              <a:t>(); </a:t>
+            </a:r>
+            <a:r>
+              <a:rPr lang="en-US" sz="1200" kern="1200" dirty="0">
+                <a:solidFill>
+                  <a:schemeClr val="tx1"/>
+                </a:solidFill>
+                <a:effectLst/>
+                <a:latin typeface="+mn-lt"/>
+                <a:ea typeface="+mn-ea"/>
+                <a:cs typeface="+mn-cs"/>
+              </a:rPr>
+              <a:t>// by default in </a:t>
+            </a:r>
+            <a:r>
+              <a:rPr lang="en-US" sz="1200" kern="1200" dirty="0" err="1">
+                <a:solidFill>
+                  <a:schemeClr val="tx1"/>
+                </a:solidFill>
+                <a:effectLst/>
+                <a:latin typeface="+mn-lt"/>
+                <a:ea typeface="+mn-ea"/>
+                <a:cs typeface="+mn-cs"/>
+              </a:rPr>
+              <a:t>CreateDefaultBuilder</a:t>
+            </a:r>
+            <a:r>
+              <a:rPr lang="en-US" dirty="0"/>
+              <a:t>                  </a:t>
+            </a:r>
+          </a:p>
+          <a:p>
+            <a:r>
+              <a:rPr lang="en-US" dirty="0" err="1"/>
+              <a:t>logging.AddDebug</a:t>
+            </a:r>
+            <a:r>
+              <a:rPr lang="en-US" dirty="0"/>
+              <a:t>(); </a:t>
+            </a:r>
+            <a:r>
+              <a:rPr lang="en-US" sz="1200" kern="1200" dirty="0">
+                <a:solidFill>
+                  <a:schemeClr val="tx1"/>
+                </a:solidFill>
+                <a:effectLst/>
+                <a:latin typeface="+mn-lt"/>
+                <a:ea typeface="+mn-ea"/>
+                <a:cs typeface="+mn-cs"/>
+              </a:rPr>
+              <a:t>// by default in </a:t>
+            </a:r>
+            <a:r>
+              <a:rPr lang="en-US" sz="1200" kern="1200" dirty="0" err="1">
+                <a:solidFill>
+                  <a:schemeClr val="tx1"/>
+                </a:solidFill>
+                <a:effectLst/>
+                <a:latin typeface="+mn-lt"/>
+                <a:ea typeface="+mn-ea"/>
+                <a:cs typeface="+mn-cs"/>
+              </a:rPr>
+              <a:t>CreateDefaultBuilder</a:t>
+            </a:r>
+            <a:r>
+              <a:rPr lang="en-US" dirty="0"/>
+              <a:t>                   </a:t>
+            </a:r>
+          </a:p>
+          <a:p>
+            <a:r>
+              <a:rPr lang="en-US" dirty="0" err="1"/>
+              <a:t>logging.AddEventSourceLogger</a:t>
+            </a:r>
+            <a:r>
+              <a:rPr lang="en-US" dirty="0"/>
+              <a:t>(); </a:t>
+            </a:r>
+            <a:r>
+              <a:rPr lang="en-US" sz="1200" kern="1200" dirty="0">
+                <a:solidFill>
+                  <a:schemeClr val="tx1"/>
+                </a:solidFill>
+                <a:effectLst/>
+                <a:latin typeface="+mn-lt"/>
+                <a:ea typeface="+mn-ea"/>
+                <a:cs typeface="+mn-cs"/>
+              </a:rPr>
+              <a:t>// by default in </a:t>
+            </a:r>
+            <a:r>
+              <a:rPr lang="en-US" sz="1200" kern="1200" dirty="0" err="1">
+                <a:solidFill>
+                  <a:schemeClr val="tx1"/>
+                </a:solidFill>
+                <a:effectLst/>
+                <a:latin typeface="+mn-lt"/>
+                <a:ea typeface="+mn-ea"/>
+                <a:cs typeface="+mn-cs"/>
+              </a:rPr>
+              <a:t>CreateDefaultBuilder</a:t>
+            </a:r>
+            <a:endParaRPr lang="en-US" sz="1200" kern="1200" dirty="0">
+              <a:solidFill>
+                <a:schemeClr val="tx1"/>
+              </a:solidFill>
+              <a:effectLst/>
+              <a:latin typeface="+mn-lt"/>
+              <a:ea typeface="+mn-ea"/>
+              <a:cs typeface="+mn-cs"/>
+            </a:endParaRPr>
+          </a:p>
+          <a:p>
+            <a:endParaRPr lang="en-US" sz="1200" kern="1200" dirty="0">
+              <a:solidFill>
+                <a:schemeClr val="tx1"/>
+              </a:solidFill>
+              <a:effectLst/>
+              <a:latin typeface="+mn-lt"/>
+              <a:ea typeface="+mn-ea"/>
+              <a:cs typeface="+mn-cs"/>
+            </a:endParaRPr>
+          </a:p>
+          <a:p>
+            <a:r>
+              <a:rPr lang="en-US" dirty="0" err="1"/>
+              <a:t>ClearProviders</a:t>
+            </a:r>
             <a:endParaRPr lang="en-US" dirty="0"/>
           </a:p>
         </p:txBody>
@@ -3725,7 +3748,7 @@
           <a:p>
             <a:fld id="{4DB2BA24-A594-42FE-968E-B893334C608F}" type="slidenum">
               <a:rPr lang="en-US" smtClean="0"/>
-              <a:t>26</a:t>
+              <a:t>25</a:t>
             </a:fld>
             <a:endParaRPr lang="en-US"/>
           </a:p>
@@ -3734,7 +3757,7 @@
     </p:spTree>
     <p:extLst>
       <p:ext uri="{BB962C8B-B14F-4D97-AF65-F5344CB8AC3E}">
-        <p14:creationId xmlns:p14="http://schemas.microsoft.com/office/powerpoint/2010/main" val="1962030772"/>
+        <p14:creationId xmlns:p14="http://schemas.microsoft.com/office/powerpoint/2010/main" val="2491721671"/>
       </p:ext>
     </p:extLst>
   </p:cSld>
@@ -3809,7 +3832,7 @@
           <a:p>
             <a:fld id="{4DB2BA24-A594-42FE-968E-B893334C608F}" type="slidenum">
               <a:rPr lang="en-US" smtClean="0"/>
-              <a:t>27</a:t>
+              <a:t>26</a:t>
             </a:fld>
             <a:endParaRPr lang="en-US"/>
           </a:p>
@@ -3818,7 +3841,7 @@
     </p:spTree>
     <p:extLst>
       <p:ext uri="{BB962C8B-B14F-4D97-AF65-F5344CB8AC3E}">
-        <p14:creationId xmlns:p14="http://schemas.microsoft.com/office/powerpoint/2010/main" val="2465997791"/>
+        <p14:creationId xmlns:p14="http://schemas.microsoft.com/office/powerpoint/2010/main" val="1962030772"/>
       </p:ext>
     </p:extLst>
   </p:cSld>
@@ -3893,7 +3916,7 @@
           <a:p>
             <a:fld id="{4DB2BA24-A594-42FE-968E-B893334C608F}" type="slidenum">
               <a:rPr lang="en-US" smtClean="0"/>
-              <a:t>28</a:t>
+              <a:t>27</a:t>
             </a:fld>
             <a:endParaRPr lang="en-US"/>
           </a:p>
@@ -3902,7 +3925,7 @@
     </p:spTree>
     <p:extLst>
       <p:ext uri="{BB962C8B-B14F-4D97-AF65-F5344CB8AC3E}">
-        <p14:creationId xmlns:p14="http://schemas.microsoft.com/office/powerpoint/2010/main" val="4134873798"/>
+        <p14:creationId xmlns:p14="http://schemas.microsoft.com/office/powerpoint/2010/main" val="2465997791"/>
       </p:ext>
     </p:extLst>
   </p:cSld>
@@ -3977,7 +4000,7 @@
           <a:p>
             <a:fld id="{4DB2BA24-A594-42FE-968E-B893334C608F}" type="slidenum">
               <a:rPr lang="en-US" smtClean="0"/>
-              <a:t>3</a:t>
+              <a:t>2</a:t>
             </a:fld>
             <a:endParaRPr lang="en-US"/>
           </a:p>
@@ -3986,7 +4009,7 @@
     </p:spTree>
     <p:extLst>
       <p:ext uri="{BB962C8B-B14F-4D97-AF65-F5344CB8AC3E}">
-        <p14:creationId xmlns:p14="http://schemas.microsoft.com/office/powerpoint/2010/main" val="1629432649"/>
+        <p14:creationId xmlns:p14="http://schemas.microsoft.com/office/powerpoint/2010/main" val="2628241040"/>
       </p:ext>
     </p:extLst>
   </p:cSld>
@@ -4040,10 +4063,7 @@
           <a:bodyPr/>
           <a:lstStyle/>
           <a:p>
-            <a:r>
-              <a:rPr lang="en-US" dirty="0"/>
-              <a:t>Separate package and can be used in other type of application</a:t>
-            </a:r>
+            <a:endParaRPr lang="en-US" dirty="0"/>
           </a:p>
         </p:txBody>
       </p:sp>
@@ -4064,7 +4084,7 @@
           <a:p>
             <a:fld id="{4DB2BA24-A594-42FE-968E-B893334C608F}" type="slidenum">
               <a:rPr lang="en-US" smtClean="0"/>
-              <a:t>29</a:t>
+              <a:t>28</a:t>
             </a:fld>
             <a:endParaRPr lang="en-US"/>
           </a:p>
@@ -4073,7 +4093,7 @@
     </p:spTree>
     <p:extLst>
       <p:ext uri="{BB962C8B-B14F-4D97-AF65-F5344CB8AC3E}">
-        <p14:creationId xmlns:p14="http://schemas.microsoft.com/office/powerpoint/2010/main" val="4268821624"/>
+        <p14:creationId xmlns:p14="http://schemas.microsoft.com/office/powerpoint/2010/main" val="4134873798"/>
       </p:ext>
     </p:extLst>
   </p:cSld>
@@ -4129,42 +4149,8 @@
           <a:p>
             <a:r>
               <a:rPr lang="en-US" dirty="0"/>
-              <a:t>ASP.NET Core apps configure and launch a </a:t>
-            </a:r>
-            <a:r>
-              <a:rPr lang="en-US" i="1" dirty="0"/>
-              <a:t>host</a:t>
-            </a:r>
-            <a:r>
-              <a:rPr lang="en-US" dirty="0"/>
-              <a:t>. The host is responsible for app startup and lifetime management. At a minimum, the host configures a server and a request processing pipeline.</a:t>
-            </a:r>
-          </a:p>
-          <a:p>
-            <a:pPr marL="0" marR="0" lvl="0" indent="0" algn="l" defTabSz="914400" rtl="0" eaLnBrk="1" fontAlgn="auto" latinLnBrk="0" hangingPunct="1">
-              <a:lnSpc>
-                <a:spcPct val="100000"/>
-              </a:lnSpc>
-              <a:spcBef>
-                <a:spcPts val="0"/>
-              </a:spcBef>
-              <a:spcAft>
-                <a:spcPts val="0"/>
-              </a:spcAft>
-              <a:buClrTx/>
-              <a:buSzTx/>
-              <a:buFontTx/>
-              <a:buNone/>
-              <a:tabLst/>
-              <a:defRPr/>
-            </a:pPr>
-            <a:r>
-              <a:rPr lang="en-US" dirty="0"/>
-              <a:t>The Generic Host will eventually replace the Web Host.</a:t>
-            </a:r>
-          </a:p>
-          <a:p>
-            <a:endParaRPr lang="en-US" dirty="0"/>
+              <a:t>Separate package and can be used in other type of application</a:t>
+            </a:r>
           </a:p>
         </p:txBody>
       </p:sp>
@@ -4185,7 +4171,7 @@
           <a:p>
             <a:fld id="{4DB2BA24-A594-42FE-968E-B893334C608F}" type="slidenum">
               <a:rPr lang="en-US" smtClean="0"/>
-              <a:t>30</a:t>
+              <a:t>29</a:t>
             </a:fld>
             <a:endParaRPr lang="en-US"/>
           </a:p>
@@ -4194,7 +4180,7 @@
     </p:spTree>
     <p:extLst>
       <p:ext uri="{BB962C8B-B14F-4D97-AF65-F5344CB8AC3E}">
-        <p14:creationId xmlns:p14="http://schemas.microsoft.com/office/powerpoint/2010/main" val="3272785764"/>
+        <p14:creationId xmlns:p14="http://schemas.microsoft.com/office/powerpoint/2010/main" val="4268821624"/>
       </p:ext>
     </p:extLst>
   </p:cSld>
@@ -4248,6 +4234,43 @@
           <a:bodyPr/>
           <a:lstStyle/>
           <a:p>
+            <a:r>
+              <a:rPr lang="en-US" dirty="0"/>
+              <a:t>ASP.NET Core apps configure and launch a </a:t>
+            </a:r>
+            <a:r>
+              <a:rPr lang="en-US" i="1" dirty="0"/>
+              <a:t>host</a:t>
+            </a:r>
+            <a:r>
+              <a:rPr lang="en-US" dirty="0"/>
+              <a:t>. The host is responsible for app startup and lifetime management. At a minimum, the host configures a server and a request processing pipeline.</a:t>
+            </a:r>
+          </a:p>
+          <a:p>
+            <a:pPr marL="0" marR="0" lvl="0" indent="0" algn="l" defTabSz="914400" rtl="0" eaLnBrk="1" fontAlgn="auto" latinLnBrk="0" hangingPunct="1">
+              <a:lnSpc>
+                <a:spcPct val="100000"/>
+              </a:lnSpc>
+              <a:spcBef>
+                <a:spcPts val="0"/>
+              </a:spcBef>
+              <a:spcAft>
+                <a:spcPts val="0"/>
+              </a:spcAft>
+              <a:buClrTx/>
+              <a:buSzTx/>
+              <a:buFontTx/>
+              <a:buNone/>
+              <a:tabLst/>
+              <a:defRPr/>
+            </a:pPr>
+            <a:r>
+              <a:rPr lang="en-US" dirty="0"/>
+              <a:t>The Generic Host will eventually replace the Web Host.</a:t>
+            </a:r>
+          </a:p>
+          <a:p>
             <a:endParaRPr lang="en-US" dirty="0"/>
           </a:p>
         </p:txBody>
@@ -4269,7 +4292,7 @@
           <a:p>
             <a:fld id="{4DB2BA24-A594-42FE-968E-B893334C608F}" type="slidenum">
               <a:rPr lang="en-US" smtClean="0"/>
-              <a:t>31</a:t>
+              <a:t>30</a:t>
             </a:fld>
             <a:endParaRPr lang="en-US"/>
           </a:p>
@@ -4278,7 +4301,7 @@
     </p:spTree>
     <p:extLst>
       <p:ext uri="{BB962C8B-B14F-4D97-AF65-F5344CB8AC3E}">
-        <p14:creationId xmlns:p14="http://schemas.microsoft.com/office/powerpoint/2010/main" val="4203467806"/>
+        <p14:creationId xmlns:p14="http://schemas.microsoft.com/office/powerpoint/2010/main" val="3272785764"/>
       </p:ext>
     </p:extLst>
   </p:cSld>
@@ -4332,12 +4355,6 @@
           <a:bodyPr/>
           <a:lstStyle/>
           <a:p>
-            <a:r>
-              <a:rPr lang="en-US" dirty="0"/>
-              <a:t>The goal of the Generic Host is to decouple the HTTP pipeline from the Web Host API to enable a wider array of host scenarios.</a:t>
-            </a:r>
-          </a:p>
-          <a:p>
             <a:endParaRPr lang="en-US" dirty="0"/>
           </a:p>
         </p:txBody>
@@ -4359,7 +4376,7 @@
           <a:p>
             <a:fld id="{4DB2BA24-A594-42FE-968E-B893334C608F}" type="slidenum">
               <a:rPr lang="en-US" smtClean="0"/>
-              <a:t>32</a:t>
+              <a:t>31</a:t>
             </a:fld>
             <a:endParaRPr lang="en-US"/>
           </a:p>
@@ -4368,7 +4385,7 @@
     </p:spTree>
     <p:extLst>
       <p:ext uri="{BB962C8B-B14F-4D97-AF65-F5344CB8AC3E}">
-        <p14:creationId xmlns:p14="http://schemas.microsoft.com/office/powerpoint/2010/main" val="3419258454"/>
+        <p14:creationId xmlns:p14="http://schemas.microsoft.com/office/powerpoint/2010/main" val="4203467806"/>
       </p:ext>
     </p:extLst>
   </p:cSld>
@@ -4422,6 +4439,12 @@
           <a:bodyPr/>
           <a:lstStyle/>
           <a:p>
+            <a:r>
+              <a:rPr lang="en-US" dirty="0"/>
+              <a:t>The goal of the Generic Host is to decouple the HTTP pipeline from the Web Host API to enable a wider array of host scenarios.</a:t>
+            </a:r>
+          </a:p>
+          <a:p>
             <a:endParaRPr lang="en-US" dirty="0"/>
           </a:p>
         </p:txBody>
@@ -4443,7 +4466,7 @@
           <a:p>
             <a:fld id="{4DB2BA24-A594-42FE-968E-B893334C608F}" type="slidenum">
               <a:rPr lang="en-US" smtClean="0"/>
-              <a:t>33</a:t>
+              <a:t>32</a:t>
             </a:fld>
             <a:endParaRPr lang="en-US"/>
           </a:p>
@@ -4452,7 +4475,7 @@
     </p:spTree>
     <p:extLst>
       <p:ext uri="{BB962C8B-B14F-4D97-AF65-F5344CB8AC3E}">
-        <p14:creationId xmlns:p14="http://schemas.microsoft.com/office/powerpoint/2010/main" val="251865418"/>
+        <p14:creationId xmlns:p14="http://schemas.microsoft.com/office/powerpoint/2010/main" val="3419258454"/>
       </p:ext>
     </p:extLst>
   </p:cSld>
@@ -4506,10 +4529,7 @@
           <a:bodyPr/>
           <a:lstStyle/>
           <a:p>
-            <a:r>
-              <a:rPr lang="en-US" dirty="0"/>
-              <a:t>Kestrel is generally recommended for best performance.</a:t>
-            </a:r>
+            <a:endParaRPr lang="en-US" dirty="0"/>
           </a:p>
         </p:txBody>
       </p:sp>
@@ -4530,7 +4550,7 @@
           <a:p>
             <a:fld id="{4DB2BA24-A594-42FE-968E-B893334C608F}" type="slidenum">
               <a:rPr lang="en-US" smtClean="0"/>
-              <a:t>34</a:t>
+              <a:t>33</a:t>
             </a:fld>
             <a:endParaRPr lang="en-US"/>
           </a:p>
@@ -4539,7 +4559,7 @@
     </p:spTree>
     <p:extLst>
       <p:ext uri="{BB962C8B-B14F-4D97-AF65-F5344CB8AC3E}">
-        <p14:creationId xmlns:p14="http://schemas.microsoft.com/office/powerpoint/2010/main" val="889370938"/>
+        <p14:creationId xmlns:p14="http://schemas.microsoft.com/office/powerpoint/2010/main" val="251865418"/>
       </p:ext>
     </p:extLst>
   </p:cSld>
@@ -4593,7 +4613,10 @@
           <a:bodyPr/>
           <a:lstStyle/>
           <a:p>
-            <a:endParaRPr lang="en-US" dirty="0"/>
+            <a:r>
+              <a:rPr lang="en-US" dirty="0"/>
+              <a:t>Kestrel is generally recommended for best performance.</a:t>
+            </a:r>
           </a:p>
         </p:txBody>
       </p:sp>
@@ -4614,7 +4637,7 @@
           <a:p>
             <a:fld id="{4DB2BA24-A594-42FE-968E-B893334C608F}" type="slidenum">
               <a:rPr lang="en-US" smtClean="0"/>
-              <a:t>35</a:t>
+              <a:t>34</a:t>
             </a:fld>
             <a:endParaRPr lang="en-US"/>
           </a:p>
@@ -4623,7 +4646,7 @@
     </p:spTree>
     <p:extLst>
       <p:ext uri="{BB962C8B-B14F-4D97-AF65-F5344CB8AC3E}">
-        <p14:creationId xmlns:p14="http://schemas.microsoft.com/office/powerpoint/2010/main" val="2651881530"/>
+        <p14:creationId xmlns:p14="http://schemas.microsoft.com/office/powerpoint/2010/main" val="889370938"/>
       </p:ext>
     </p:extLst>
   </p:cSld>
@@ -4698,7 +4721,7 @@
           <a:p>
             <a:fld id="{4DB2BA24-A594-42FE-968E-B893334C608F}" type="slidenum">
               <a:rPr lang="en-US" smtClean="0"/>
-              <a:t>36</a:t>
+              <a:t>35</a:t>
             </a:fld>
             <a:endParaRPr lang="en-US"/>
           </a:p>
@@ -4707,7 +4730,7 @@
     </p:spTree>
     <p:extLst>
       <p:ext uri="{BB962C8B-B14F-4D97-AF65-F5344CB8AC3E}">
-        <p14:creationId xmlns:p14="http://schemas.microsoft.com/office/powerpoint/2010/main" val="1338910784"/>
+        <p14:creationId xmlns:p14="http://schemas.microsoft.com/office/powerpoint/2010/main" val="2651881530"/>
       </p:ext>
     </p:extLst>
   </p:cSld>
@@ -4772,7 +4795,7 @@
             <a:spLocks noGrp="1"/>
           </p:cNvSpPr>
           <p:nvPr>
-            <p:ph type="sldNum" sz="quarter" idx="10"/>
+            <p:ph type="sldNum" sz="quarter" idx="5"/>
           </p:nvPr>
         </p:nvSpPr>
         <p:spPr/>
@@ -4782,7 +4805,7 @@
           <a:p>
             <a:fld id="{4DB2BA24-A594-42FE-968E-B893334C608F}" type="slidenum">
               <a:rPr lang="en-US" smtClean="0"/>
-              <a:t>38</a:t>
+              <a:t>36</a:t>
             </a:fld>
             <a:endParaRPr lang="en-US"/>
           </a:p>
@@ -4791,7 +4814,7 @@
     </p:spTree>
     <p:extLst>
       <p:ext uri="{BB962C8B-B14F-4D97-AF65-F5344CB8AC3E}">
-        <p14:creationId xmlns:p14="http://schemas.microsoft.com/office/powerpoint/2010/main" val="2560513446"/>
+        <p14:creationId xmlns:p14="http://schemas.microsoft.com/office/powerpoint/2010/main" val="1338910784"/>
       </p:ext>
     </p:extLst>
   </p:cSld>
@@ -4845,16 +4868,7 @@
           <a:bodyPr/>
           <a:lstStyle/>
           <a:p>
-            <a:r>
-              <a:rPr lang="en-US" dirty="0"/>
-              <a:t>Example with dependency injection into view</a:t>
-            </a:r>
-          </a:p>
-          <a:p>
-            <a:r>
-              <a:rPr lang="en-US" dirty="0"/>
-              <a:t>Filters https://docs.microsoft.com/en-us/aspnet/core/razor-pages/filter?view=aspnetcore-2.1</a:t>
-            </a:r>
+            <a:endParaRPr lang="en-US" dirty="0"/>
           </a:p>
         </p:txBody>
       </p:sp>
@@ -4875,7 +4889,7 @@
           <a:p>
             <a:fld id="{4DB2BA24-A594-42FE-968E-B893334C608F}" type="slidenum">
               <a:rPr lang="en-US" smtClean="0"/>
-              <a:t>39</a:t>
+              <a:t>38</a:t>
             </a:fld>
             <a:endParaRPr lang="en-US"/>
           </a:p>
@@ -4884,7 +4898,7 @@
     </p:spTree>
     <p:extLst>
       <p:ext uri="{BB962C8B-B14F-4D97-AF65-F5344CB8AC3E}">
-        <p14:creationId xmlns:p14="http://schemas.microsoft.com/office/powerpoint/2010/main" val="970514146"/>
+        <p14:creationId xmlns:p14="http://schemas.microsoft.com/office/powerpoint/2010/main" val="2560513446"/>
       </p:ext>
     </p:extLst>
   </p:cSld>
@@ -4959,7 +4973,7 @@
           <a:p>
             <a:fld id="{4DB2BA24-A594-42FE-968E-B893334C608F}" type="slidenum">
               <a:rPr lang="en-US" smtClean="0"/>
-              <a:t>4</a:t>
+              <a:t>3</a:t>
             </a:fld>
             <a:endParaRPr lang="en-US"/>
           </a:p>
@@ -4968,7 +4982,7 @@
     </p:spTree>
     <p:extLst>
       <p:ext uri="{BB962C8B-B14F-4D97-AF65-F5344CB8AC3E}">
-        <p14:creationId xmlns:p14="http://schemas.microsoft.com/office/powerpoint/2010/main" val="1270124232"/>
+        <p14:creationId xmlns:p14="http://schemas.microsoft.com/office/powerpoint/2010/main" val="1629432649"/>
       </p:ext>
     </p:extLst>
   </p:cSld>
@@ -5022,7 +5036,16 @@
           <a:bodyPr/>
           <a:lstStyle/>
           <a:p>
-            <a:endParaRPr lang="en-US" dirty="0"/>
+            <a:r>
+              <a:rPr lang="en-US" dirty="0"/>
+              <a:t>Example with dependency injection into view</a:t>
+            </a:r>
+          </a:p>
+          <a:p>
+            <a:r>
+              <a:rPr lang="en-US" dirty="0"/>
+              <a:t>Filters https://docs.microsoft.com/en-us/aspnet/core/razor-pages/filter?view=aspnetcore-2.1</a:t>
+            </a:r>
           </a:p>
         </p:txBody>
       </p:sp>
@@ -5043,6 +5066,90 @@
           <a:p>
             <a:fld id="{4DB2BA24-A594-42FE-968E-B893334C608F}" type="slidenum">
               <a:rPr lang="en-US" smtClean="0"/>
+              <a:t>39</a:t>
+            </a:fld>
+            <a:endParaRPr lang="en-US"/>
+          </a:p>
+        </p:txBody>
+      </p:sp>
+    </p:spTree>
+    <p:extLst>
+      <p:ext uri="{BB962C8B-B14F-4D97-AF65-F5344CB8AC3E}">
+        <p14:creationId xmlns:p14="http://schemas.microsoft.com/office/powerpoint/2010/main" val="970514146"/>
+      </p:ext>
+    </p:extLst>
+  </p:cSld>
+  <p:clrMapOvr>
+    <a:masterClrMapping/>
+  </p:clrMapOvr>
+</p:notes>
+</file>
+
+<file path=ppt/notesSlides/notesSlide31.xml><?xml version="1.0" encoding="utf-8"?>
+<p:notes xmlns:a="http://schemas.openxmlformats.org/drawingml/2006/main" xmlns:r="http://schemas.openxmlformats.org/officeDocument/2006/relationships" xmlns:p="http://schemas.openxmlformats.org/presentationml/2006/main">
+  <p:cSld>
+    <p:spTree>
+      <p:nvGrpSpPr>
+        <p:cNvPr id="1" name=""/>
+        <p:cNvGrpSpPr/>
+        <p:nvPr/>
+      </p:nvGrpSpPr>
+      <p:grpSpPr>
+        <a:xfrm>
+          <a:off x="0" y="0"/>
+          <a:ext cx="0" cy="0"/>
+          <a:chOff x="0" y="0"/>
+          <a:chExt cx="0" cy="0"/>
+        </a:xfrm>
+      </p:grpSpPr>
+      <p:sp>
+        <p:nvSpPr>
+          <p:cNvPr id="2" name="Slide Image Placeholder 1"/>
+          <p:cNvSpPr>
+            <a:spLocks noGrp="1" noRot="1" noChangeAspect="1"/>
+          </p:cNvSpPr>
+          <p:nvPr>
+            <p:ph type="sldImg"/>
+          </p:nvPr>
+        </p:nvSpPr>
+        <p:spPr/>
+      </p:sp>
+      <p:sp>
+        <p:nvSpPr>
+          <p:cNvPr id="3" name="Notes Placeholder 2"/>
+          <p:cNvSpPr>
+            <a:spLocks noGrp="1"/>
+          </p:cNvSpPr>
+          <p:nvPr>
+            <p:ph type="body" idx="1"/>
+          </p:nvPr>
+        </p:nvSpPr>
+        <p:spPr/>
+        <p:txBody>
+          <a:bodyPr/>
+          <a:lstStyle/>
+          <a:p>
+            <a:endParaRPr lang="en-US" dirty="0"/>
+          </a:p>
+        </p:txBody>
+      </p:sp>
+      <p:sp>
+        <p:nvSpPr>
+          <p:cNvPr id="4" name="Slide Number Placeholder 3"/>
+          <p:cNvSpPr>
+            <a:spLocks noGrp="1"/>
+          </p:cNvSpPr>
+          <p:nvPr>
+            <p:ph type="sldNum" sz="quarter" idx="10"/>
+          </p:nvPr>
+        </p:nvSpPr>
+        <p:spPr/>
+        <p:txBody>
+          <a:bodyPr/>
+          <a:lstStyle/>
+          <a:p>
+            <a:fld id="{4DB2BA24-A594-42FE-968E-B893334C608F}" type="slidenum">
+              <a:rPr lang="en-US" smtClean="0"/>
               <a:t>40</a:t>
             </a:fld>
             <a:endParaRPr lang="en-US"/>
@@ -5062,7 +5169,7 @@
 </p:notes>
 </file>
 
-<file path=ppt/notesSlides/notesSlide31.xml><?xml version="1.0" encoding="utf-8"?>
+<file path=ppt/notesSlides/notesSlide32.xml><?xml version="1.0" encoding="utf-8"?>
 <p:notes xmlns:a="http://schemas.openxmlformats.org/drawingml/2006/main" xmlns:r="http://schemas.openxmlformats.org/officeDocument/2006/relationships" xmlns:p="http://schemas.openxmlformats.org/presentationml/2006/main">
   <p:cSld>
     <p:spTree>
@@ -5211,7 +5318,7 @@
           <a:p>
             <a:fld id="{4DB2BA24-A594-42FE-968E-B893334C608F}" type="slidenum">
               <a:rPr lang="en-US" smtClean="0"/>
-              <a:t>5</a:t>
+              <a:t>4</a:t>
             </a:fld>
             <a:endParaRPr lang="en-US"/>
           </a:p>
@@ -5220,7 +5327,7 @@
     </p:spTree>
     <p:extLst>
       <p:ext uri="{BB962C8B-B14F-4D97-AF65-F5344CB8AC3E}">
-        <p14:creationId xmlns:p14="http://schemas.microsoft.com/office/powerpoint/2010/main" val="561404440"/>
+        <p14:creationId xmlns:p14="http://schemas.microsoft.com/office/powerpoint/2010/main" val="1270124232"/>
       </p:ext>
     </p:extLst>
   </p:cSld>
@@ -5295,7 +5402,7 @@
           <a:p>
             <a:fld id="{4DB2BA24-A594-42FE-968E-B893334C608F}" type="slidenum">
               <a:rPr lang="en-US" smtClean="0"/>
-              <a:t>6</a:t>
+              <a:t>5</a:t>
             </a:fld>
             <a:endParaRPr lang="en-US"/>
           </a:p>
@@ -5304,7 +5411,7 @@
     </p:spTree>
     <p:extLst>
       <p:ext uri="{BB962C8B-B14F-4D97-AF65-F5344CB8AC3E}">
-        <p14:creationId xmlns:p14="http://schemas.microsoft.com/office/powerpoint/2010/main" val="1504232583"/>
+        <p14:creationId xmlns:p14="http://schemas.microsoft.com/office/powerpoint/2010/main" val="561404440"/>
       </p:ext>
     </p:extLst>
   </p:cSld>
@@ -5358,24 +5465,7 @@
           <a:bodyPr/>
           <a:lstStyle/>
           <a:p>
-            <a:pPr marL="0" marR="0" lvl="0" indent="0" algn="l" defTabSz="914400" rtl="0" eaLnBrk="1" fontAlgn="auto" latinLnBrk="0" hangingPunct="1">
-              <a:lnSpc>
-                <a:spcPct val="100000"/>
-              </a:lnSpc>
-              <a:spcBef>
-                <a:spcPts val="0"/>
-              </a:spcBef>
-              <a:spcAft>
-                <a:spcPts val="0"/>
-              </a:spcAft>
-              <a:buClrTx/>
-              <a:buSzTx/>
-              <a:buFontTx/>
-              <a:buNone/>
-              <a:tabLst/>
-              <a:defRPr/>
-            </a:pPr>
-            <a:endParaRPr lang="en-US" sz="1200" dirty="0"/>
+            <a:endParaRPr lang="en-US" dirty="0"/>
           </a:p>
         </p:txBody>
       </p:sp>
@@ -5396,7 +5486,7 @@
           <a:p>
             <a:fld id="{4DB2BA24-A594-42FE-968E-B893334C608F}" type="slidenum">
               <a:rPr lang="en-US" smtClean="0"/>
-              <a:t>8</a:t>
+              <a:t>6</a:t>
             </a:fld>
             <a:endParaRPr lang="en-US"/>
           </a:p>
@@ -5405,7 +5495,7 @@
     </p:spTree>
     <p:extLst>
       <p:ext uri="{BB962C8B-B14F-4D97-AF65-F5344CB8AC3E}">
-        <p14:creationId xmlns:p14="http://schemas.microsoft.com/office/powerpoint/2010/main" val="2087440262"/>
+        <p14:creationId xmlns:p14="http://schemas.microsoft.com/office/powerpoint/2010/main" val="1504232583"/>
       </p:ext>
     </p:extLst>
   </p:cSld>
@@ -5459,7 +5549,24 @@
           <a:bodyPr/>
           <a:lstStyle/>
           <a:p>
-            <a:endParaRPr lang="en-US" dirty="0"/>
+            <a:pPr marL="0" marR="0" lvl="0" indent="0" algn="l" defTabSz="914400" rtl="0" eaLnBrk="1" fontAlgn="auto" latinLnBrk="0" hangingPunct="1">
+              <a:lnSpc>
+                <a:spcPct val="100000"/>
+              </a:lnSpc>
+              <a:spcBef>
+                <a:spcPts val="0"/>
+              </a:spcBef>
+              <a:spcAft>
+                <a:spcPts val="0"/>
+              </a:spcAft>
+              <a:buClrTx/>
+              <a:buSzTx/>
+              <a:buFontTx/>
+              <a:buNone/>
+              <a:tabLst/>
+              <a:defRPr/>
+            </a:pPr>
+            <a:endParaRPr lang="en-US" sz="1200" dirty="0"/>
           </a:p>
         </p:txBody>
       </p:sp>
@@ -5480,7 +5587,7 @@
           <a:p>
             <a:fld id="{4DB2BA24-A594-42FE-968E-B893334C608F}" type="slidenum">
               <a:rPr lang="en-US" smtClean="0"/>
-              <a:t>9</a:t>
+              <a:t>8</a:t>
             </a:fld>
             <a:endParaRPr lang="en-US"/>
           </a:p>
@@ -5489,7 +5596,7 @@
     </p:spTree>
     <p:extLst>
       <p:ext uri="{BB962C8B-B14F-4D97-AF65-F5344CB8AC3E}">
-        <p14:creationId xmlns:p14="http://schemas.microsoft.com/office/powerpoint/2010/main" val="1866717846"/>
+        <p14:creationId xmlns:p14="http://schemas.microsoft.com/office/powerpoint/2010/main" val="2087440262"/>
       </p:ext>
     </p:extLst>
   </p:cSld>
@@ -5554,7 +5661,7 @@
             <a:spLocks noGrp="1"/>
           </p:cNvSpPr>
           <p:nvPr>
-            <p:ph type="sldNum" sz="quarter" idx="5"/>
+            <p:ph type="sldNum" sz="quarter" idx="10"/>
           </p:nvPr>
         </p:nvSpPr>
         <p:spPr/>
@@ -5564,7 +5671,7 @@
           <a:p>
             <a:fld id="{4DB2BA24-A594-42FE-968E-B893334C608F}" type="slidenum">
               <a:rPr lang="en-US" smtClean="0"/>
-              <a:t>12</a:t>
+              <a:t>9</a:t>
             </a:fld>
             <a:endParaRPr lang="en-US"/>
           </a:p>
@@ -5573,7 +5680,7 @@
     </p:spTree>
     <p:extLst>
       <p:ext uri="{BB962C8B-B14F-4D97-AF65-F5344CB8AC3E}">
-        <p14:creationId xmlns:p14="http://schemas.microsoft.com/office/powerpoint/2010/main" val="4033055360"/>
+        <p14:creationId xmlns:p14="http://schemas.microsoft.com/office/powerpoint/2010/main" val="1866717846"/>
       </p:ext>
     </p:extLst>
   </p:cSld>
@@ -5627,29 +5734,6 @@
           <a:bodyPr/>
           <a:lstStyle/>
           <a:p>
-            <a:pPr marL="0" marR="0" lvl="0" indent="0" algn="l" defTabSz="914400" rtl="0" eaLnBrk="1" fontAlgn="auto" latinLnBrk="0" hangingPunct="1">
-              <a:lnSpc>
-                <a:spcPct val="100000"/>
-              </a:lnSpc>
-              <a:spcBef>
-                <a:spcPts val="0"/>
-              </a:spcBef>
-              <a:spcAft>
-                <a:spcPts val="0"/>
-              </a:spcAft>
-              <a:buClrTx/>
-              <a:buSzTx/>
-              <a:buFontTx/>
-              <a:buNone/>
-              <a:tabLst/>
-              <a:defRPr/>
-            </a:pPr>
-            <a:r>
-              <a:rPr lang="en-US" dirty="0"/>
-              <a:t>https://github.com/dotnet/cli Command Line Interface</a:t>
-            </a:r>
-          </a:p>
-          <a:p>
             <a:endParaRPr lang="en-US" dirty="0"/>
           </a:p>
         </p:txBody>
@@ -5671,7 +5755,7 @@
           <a:p>
             <a:fld id="{4DB2BA24-A594-42FE-968E-B893334C608F}" type="slidenum">
               <a:rPr lang="en-US" smtClean="0"/>
-              <a:t>15</a:t>
+              <a:t>12</a:t>
             </a:fld>
             <a:endParaRPr lang="en-US"/>
           </a:p>
@@ -5680,7 +5764,7 @@
     </p:spTree>
     <p:extLst>
       <p:ext uri="{BB962C8B-B14F-4D97-AF65-F5344CB8AC3E}">
-        <p14:creationId xmlns:p14="http://schemas.microsoft.com/office/powerpoint/2010/main" val="1736990485"/>
+        <p14:creationId xmlns:p14="http://schemas.microsoft.com/office/powerpoint/2010/main" val="4033055360"/>
       </p:ext>
     </p:extLst>
   </p:cSld>

</xml_diff>